<commit_message>
correcting the wording in the title for slides 2/3
</commit_message>
<xml_diff>
--- a/test/t-dm1_qsp_sim.pptx
+++ b/test/t-dm1_qsp_sim.pptx
@@ -4659,7 +4659,7 @@
               <a:defRPr spc="-61" sz="6100"/>
             </a:pPr>
             <a:r>
-              <a:t>What does happen if CL of ADC lowering?</a:t>
+              <a:t>What does happen if CL of ADC increasing?</a:t>
             </a:r>
           </a:p>
         </p:txBody>
@@ -4815,7 +4815,7 @@
               <a:defRPr spc="-68" sz="6800"/>
             </a:pPr>
             <a:r>
-              <a:t>What does happen if CL of ADC lowering?</a:t>
+              <a:t>What does happen if CL of ADC increasing?</a:t>
             </a:r>
           </a:p>
         </p:txBody>

</xml_diff>